<commit_message>
plotNorm help improved. Now supports other normalizations provided by calcNormFactors.
</commit_message>
<xml_diff>
--- a/DGEobj Short Intro-16May2019.pptx
+++ b/DGEobj Short Intro-16May2019.pptx
@@ -3060,11 +3060,11 @@
               <a:t>data sharing and </a:t>
             </a:r>
             <a:r>
-              <a:rPr lang="en-US" sz="1600" b="0"/>
-              <a:t>automated </a:t>
-            </a:r>
-            <a:r>
-              <a:rPr lang="en-US" sz="1600" b="0" smtClean="0"/>
+              <a:rPr lang="en-US" sz="1600" b="0" dirty="0" smtClean="0"/>
+              <a:t>scripted </a:t>
+            </a:r>
+            <a:r>
+              <a:rPr lang="en-US" sz="1600" b="0" dirty="0" smtClean="0"/>
               <a:t>meta-analysis</a:t>
             </a:r>
             <a:endParaRPr lang="en-US" sz="1600" b="0" dirty="0"/>
@@ -3628,7 +3628,12 @@
             <p:ph idx="1"/>
           </p:nvPr>
         </p:nvSpPr>
-        <p:spPr/>
+        <p:spPr>
+          <a:xfrm>
+            <a:off x="684213" y="1377538"/>
+            <a:ext cx="7859712" cy="4785756"/>
+          </a:xfrm>
+        </p:spPr>
         <p:txBody>
           <a:bodyPr/>
           <a:lstStyle/>
@@ -3667,7 +3672,23 @@
             </a:pPr>
             <a:r>
               <a:rPr lang="en-US" b="0" dirty="0" smtClean="0"/>
-              <a:t>We store information about the data objects as R attributes on the DGEobj.  In some cases individual elements have attributes as well.</a:t>
+              <a:t>We store information about the data objects as R attributes </a:t>
+            </a:r>
+            <a:r>
+              <a:rPr lang="en-US" b="0" dirty="0" smtClean="0"/>
+              <a:t>attached to </a:t>
+            </a:r>
+            <a:r>
+              <a:rPr lang="en-US" b="0" dirty="0" smtClean="0"/>
+              <a:t>the DGEobj.  In some cases individual </a:t>
+            </a:r>
+            <a:r>
+              <a:rPr lang="en-US" b="0" dirty="0" smtClean="0"/>
+              <a:t>items </a:t>
+            </a:r>
+            <a:r>
+              <a:rPr lang="en-US" b="0" dirty="0" smtClean="0"/>
+              <a:t>have attributes as well.</a:t>
             </a:r>
           </a:p>
           <a:p>
@@ -3842,7 +3863,6 @@
               <a:rPr lang="en-US" b="0" dirty="0" smtClean="0"/>
               <a:t>Insures consistent annotation</a:t>
             </a:r>
-            <a:endParaRPr lang="en-US" b="0" dirty="0" smtClean="0"/>
           </a:p>
           <a:p>
             <a:pPr marL="457200" indent="-457200">
@@ -7295,12 +7315,12 @@
 </file>
 
 <file path=customXml/item1.xml><?xml version="1.0" encoding="utf-8"?>
-<?mso-contentType ?>
-<FormTemplates xmlns="http://schemas.microsoft.com/sharepoint/v3/contenttype/forms">
-  <Display>DocumentLibraryForm</Display>
-  <Edit>DocumentLibraryForm</Edit>
-  <New>DocumentLibraryForm</New>
-</FormTemplates>
+<p:properties xmlns:p="http://schemas.microsoft.com/office/2006/metadata/properties" xmlns:xsi="http://www.w3.org/2001/XMLSchema-instance">
+  <documentManagement>
+    <PublishingExpirationDate xmlns="http://schemas.microsoft.com/sharepoint/v3" xsi:nil="true"/>
+    <PublishingStartDate xmlns="http://schemas.microsoft.com/sharepoint/v3" xsi:nil="true"/>
+  </documentManagement>
+</p:properties>
 </file>
 
 <file path=customXml/item2.xml><?xml version="1.0" encoding="utf-8"?>
@@ -7370,18 +7390,25 @@
 </file>
 
 <file path=customXml/item3.xml><?xml version="1.0" encoding="utf-8"?>
-<p:properties xmlns:p="http://schemas.microsoft.com/office/2006/metadata/properties" xmlns:xsi="http://www.w3.org/2001/XMLSchema-instance">
-  <documentManagement>
-    <PublishingExpirationDate xmlns="http://schemas.microsoft.com/sharepoint/v3" xsi:nil="true"/>
-    <PublishingStartDate xmlns="http://schemas.microsoft.com/sharepoint/v3" xsi:nil="true"/>
-  </documentManagement>
-</p:properties>
+<?mso-contentType ?>
+<FormTemplates xmlns="http://schemas.microsoft.com/sharepoint/v3/contenttype/forms">
+  <Display>DocumentLibraryForm</Display>
+  <Edit>DocumentLibraryForm</Edit>
+  <New>DocumentLibraryForm</New>
+</FormTemplates>
 </file>
 
 <file path=customXml/itemProps1.xml><?xml version="1.0" encoding="utf-8"?>
-<ds:datastoreItem xmlns:ds="http://schemas.openxmlformats.org/officeDocument/2006/customXml" ds:itemID="{7BEEAFA4-C65A-43C8-B565-5092855FE3D8}">
+<ds:datastoreItem xmlns:ds="http://schemas.openxmlformats.org/officeDocument/2006/customXml" ds:itemID="{22D02B40-73A0-49EC-984E-6E21484878D7}">
   <ds:schemaRefs>
-    <ds:schemaRef ds:uri="http://schemas.microsoft.com/sharepoint/v3/contenttype/forms"/>
+    <ds:schemaRef ds:uri="http://schemas.microsoft.com/office/2006/metadata/properties"/>
+    <ds:schemaRef ds:uri="http://schemas.microsoft.com/sharepoint/v3"/>
+    <ds:schemaRef ds:uri="http://purl.org/dc/terms/"/>
+    <ds:schemaRef ds:uri="http://schemas.openxmlformats.org/package/2006/metadata/core-properties"/>
+    <ds:schemaRef ds:uri="http://schemas.microsoft.com/office/2006/documentManagement/types"/>
+    <ds:schemaRef ds:uri="http://purl.org/dc/elements/1.1/"/>
+    <ds:schemaRef ds:uri="http://www.w3.org/XML/1998/namespace"/>
+    <ds:schemaRef ds:uri="http://purl.org/dc/dcmitype/"/>
   </ds:schemaRefs>
 </ds:datastoreItem>
 </file>
@@ -7404,16 +7431,9 @@
 </file>
 
 <file path=customXml/itemProps3.xml><?xml version="1.0" encoding="utf-8"?>
-<ds:datastoreItem xmlns:ds="http://schemas.openxmlformats.org/officeDocument/2006/customXml" ds:itemID="{22D02B40-73A0-49EC-984E-6E21484878D7}">
+<ds:datastoreItem xmlns:ds="http://schemas.openxmlformats.org/officeDocument/2006/customXml" ds:itemID="{7BEEAFA4-C65A-43C8-B565-5092855FE3D8}">
   <ds:schemaRefs>
-    <ds:schemaRef ds:uri="http://schemas.microsoft.com/office/2006/metadata/properties"/>
-    <ds:schemaRef ds:uri="http://schemas.microsoft.com/sharepoint/v3"/>
-    <ds:schemaRef ds:uri="http://purl.org/dc/terms/"/>
-    <ds:schemaRef ds:uri="http://schemas.openxmlformats.org/package/2006/metadata/core-properties"/>
-    <ds:schemaRef ds:uri="http://schemas.microsoft.com/office/2006/documentManagement/types"/>
-    <ds:schemaRef ds:uri="http://purl.org/dc/elements/1.1/"/>
-    <ds:schemaRef ds:uri="http://www.w3.org/XML/1998/namespace"/>
-    <ds:schemaRef ds:uri="http://purl.org/dc/dcmitype/"/>
+    <ds:schemaRef ds:uri="http://schemas.microsoft.com/sharepoint/v3/contenttype/forms"/>
   </ds:schemaRefs>
 </ds:datastoreItem>
 </file>
</xml_diff>